<commit_message>
2019/12/06 11:53 Architecture png update
</commit_message>
<xml_diff>
--- a/Final project/INFO 5100 Final Project.pptx
+++ b/Final project/INFO 5100 Final Project.pptx
@@ -276,38 +276,37 @@
           <a:p>
             <a:pPr lvl="0"/>
             <a:r>
-              <a:rPr lang="zh-TW" altLang="en-US" smtClean="0"/>
+              <a:rPr lang="zh-TW" altLang="en-US"/>
               <a:t>編輯母片文字樣式</a:t>
             </a:r>
           </a:p>
           <a:p>
             <a:pPr lvl="1"/>
             <a:r>
-              <a:rPr lang="zh-TW" altLang="en-US" smtClean="0"/>
+              <a:rPr lang="zh-TW" altLang="en-US"/>
               <a:t>第二層</a:t>
             </a:r>
           </a:p>
           <a:p>
             <a:pPr lvl="2"/>
             <a:r>
-              <a:rPr lang="zh-TW" altLang="en-US" smtClean="0"/>
+              <a:rPr lang="zh-TW" altLang="en-US"/>
               <a:t>第三層</a:t>
             </a:r>
           </a:p>
           <a:p>
             <a:pPr lvl="3"/>
             <a:r>
-              <a:rPr lang="zh-TW" altLang="en-US" smtClean="0"/>
+              <a:rPr lang="zh-TW" altLang="en-US"/>
               <a:t>第四層</a:t>
             </a:r>
           </a:p>
           <a:p>
             <a:pPr lvl="4"/>
             <a:r>
-              <a:rPr lang="zh-TW" altLang="en-US" smtClean="0"/>
+              <a:rPr lang="zh-TW" altLang="en-US"/>
               <a:t>第五層</a:t>
             </a:r>
-            <a:endParaRPr lang="zh-TW" altLang="en-US"/>
           </a:p>
         </p:txBody>
       </p:sp>
@@ -777,7 +776,7 @@
           <a:lstStyle/>
           <a:p>
             <a:r>
-              <a:rPr lang="en-US" altLang="zh-TW" dirty="0" smtClean="0"/>
+              <a:rPr lang="en-US" altLang="zh-TW" dirty="0"/>
               <a:t>screenshots</a:t>
             </a:r>
             <a:endParaRPr lang="zh-TW" altLang="en-US" dirty="0"/>
@@ -865,7 +864,7 @@
           <a:lstStyle/>
           <a:p>
             <a:r>
-              <a:rPr lang="en-US" altLang="zh-TW" dirty="0" smtClean="0"/>
+              <a:rPr lang="en-US" altLang="zh-TW" dirty="0"/>
               <a:t>screenshots</a:t>
             </a:r>
             <a:endParaRPr lang="zh-TW" altLang="en-US" dirty="0"/>
@@ -953,11 +952,11 @@
           <a:lstStyle/>
           <a:p>
             <a:r>
-              <a:rPr lang="en-US" altLang="zh-TW" dirty="0" smtClean="0"/>
+              <a:rPr lang="en-US" altLang="zh-TW" dirty="0"/>
               <a:t>And why would a global</a:t>
             </a:r>
             <a:r>
-              <a:rPr lang="en-US" altLang="zh-TW" baseline="0" dirty="0" smtClean="0"/>
+              <a:rPr lang="en-US" altLang="zh-TW" baseline="0" dirty="0"/>
               <a:t> company do it for free? </a:t>
             </a:r>
           </a:p>
@@ -966,7 +965,7 @@
               <a:buAutoNum type="arabicPeriod"/>
             </a:pPr>
             <a:r>
-              <a:rPr lang="en-US" altLang="zh-TW" baseline="0" dirty="0" smtClean="0"/>
+              <a:rPr lang="en-US" altLang="zh-TW" baseline="0" dirty="0"/>
               <a:t>It can improve the reputation of the company.</a:t>
             </a:r>
           </a:p>
@@ -975,7 +974,7 @@
               <a:buAutoNum type="arabicPeriod"/>
             </a:pPr>
             <a:r>
-              <a:rPr lang="en-US" altLang="zh-TW" baseline="0" dirty="0" smtClean="0"/>
+              <a:rPr lang="en-US" altLang="zh-TW" baseline="0" dirty="0"/>
               <a:t>They can give back to the society.</a:t>
             </a:r>
           </a:p>
@@ -984,7 +983,7 @@
               <a:buAutoNum type="arabicPeriod"/>
             </a:pPr>
             <a:r>
-              <a:rPr lang="en-US" altLang="zh-TW" baseline="0" dirty="0" smtClean="0"/>
+              <a:rPr lang="en-US" altLang="zh-TW" baseline="0" dirty="0"/>
               <a:t>It will definitely bring a great commercial effect. Maybe the money they save on advertising is less than the money they help the charity.</a:t>
             </a:r>
             <a:endParaRPr lang="zh-TW" altLang="en-US" dirty="0"/>
@@ -1157,7 +1156,7 @@
           </a:lstStyle>
           <a:p>
             <a:r>
-              <a:rPr lang="zh-TW" altLang="en-US" smtClean="0"/>
+              <a:rPr lang="zh-TW" altLang="en-US"/>
               <a:t>按一下以編輯母片標題樣式</a:t>
             </a:r>
             <a:endParaRPr lang="en-US" dirty="0"/>
@@ -1229,7 +1228,7 @@
           </a:lstStyle>
           <a:p>
             <a:r>
-              <a:rPr lang="zh-TW" altLang="en-US" smtClean="0"/>
+              <a:rPr lang="zh-TW" altLang="en-US"/>
               <a:t>按一下以編輯母片副標題樣式</a:t>
             </a:r>
             <a:endParaRPr lang="en-US" dirty="0"/>
@@ -1385,7 +1384,7 @@
           <a:lstStyle/>
           <a:p>
             <a:r>
-              <a:rPr lang="zh-TW" altLang="en-US" smtClean="0"/>
+              <a:rPr lang="zh-TW" altLang="en-US"/>
               <a:t>按一下以編輯母片標題樣式</a:t>
             </a:r>
             <a:endParaRPr lang="en-US" dirty="0"/>
@@ -1409,35 +1408,35 @@
           <a:p>
             <a:pPr lvl="0"/>
             <a:r>
-              <a:rPr lang="zh-TW" altLang="en-US" smtClean="0"/>
+              <a:rPr lang="zh-TW" altLang="en-US"/>
               <a:t>編輯母片文字樣式</a:t>
             </a:r>
           </a:p>
           <a:p>
             <a:pPr lvl="1"/>
             <a:r>
-              <a:rPr lang="zh-TW" altLang="en-US" smtClean="0"/>
+              <a:rPr lang="zh-TW" altLang="en-US"/>
               <a:t>第二層</a:t>
             </a:r>
           </a:p>
           <a:p>
             <a:pPr lvl="2"/>
             <a:r>
-              <a:rPr lang="zh-TW" altLang="en-US" smtClean="0"/>
+              <a:rPr lang="zh-TW" altLang="en-US"/>
               <a:t>第三層</a:t>
             </a:r>
           </a:p>
           <a:p>
             <a:pPr lvl="3"/>
             <a:r>
-              <a:rPr lang="zh-TW" altLang="en-US" smtClean="0"/>
+              <a:rPr lang="zh-TW" altLang="en-US"/>
               <a:t>第四層</a:t>
             </a:r>
           </a:p>
           <a:p>
             <a:pPr lvl="4"/>
             <a:r>
-              <a:rPr lang="zh-TW" altLang="en-US" smtClean="0"/>
+              <a:rPr lang="zh-TW" altLang="en-US"/>
               <a:t>第五層</a:t>
             </a:r>
             <a:endParaRPr lang="en-US" dirty="0"/>
@@ -1636,7 +1635,7 @@
           <a:lstStyle/>
           <a:p>
             <a:r>
-              <a:rPr lang="zh-TW" altLang="en-US" smtClean="0"/>
+              <a:rPr lang="zh-TW" altLang="en-US"/>
               <a:t>按一下以編輯母片標題樣式</a:t>
             </a:r>
             <a:endParaRPr lang="en-US" dirty="0"/>
@@ -1665,35 +1664,35 @@
           <a:p>
             <a:pPr lvl="0"/>
             <a:r>
-              <a:rPr lang="zh-TW" altLang="en-US" smtClean="0"/>
+              <a:rPr lang="zh-TW" altLang="en-US"/>
               <a:t>編輯母片文字樣式</a:t>
             </a:r>
           </a:p>
           <a:p>
             <a:pPr lvl="1"/>
             <a:r>
-              <a:rPr lang="zh-TW" altLang="en-US" smtClean="0"/>
+              <a:rPr lang="zh-TW" altLang="en-US"/>
               <a:t>第二層</a:t>
             </a:r>
           </a:p>
           <a:p>
             <a:pPr lvl="2"/>
             <a:r>
-              <a:rPr lang="zh-TW" altLang="en-US" smtClean="0"/>
+              <a:rPr lang="zh-TW" altLang="en-US"/>
               <a:t>第三層</a:t>
             </a:r>
           </a:p>
           <a:p>
             <a:pPr lvl="3"/>
             <a:r>
-              <a:rPr lang="zh-TW" altLang="en-US" smtClean="0"/>
+              <a:rPr lang="zh-TW" altLang="en-US"/>
               <a:t>第四層</a:t>
             </a:r>
           </a:p>
           <a:p>
             <a:pPr lvl="4"/>
             <a:r>
-              <a:rPr lang="zh-TW" altLang="en-US" smtClean="0"/>
+              <a:rPr lang="zh-TW" altLang="en-US"/>
               <a:t>第五層</a:t>
             </a:r>
             <a:endParaRPr lang="en-US" dirty="0"/>
@@ -1815,7 +1814,7 @@
           </a:lstStyle>
           <a:p>
             <a:r>
-              <a:rPr lang="zh-TW" altLang="en-US" smtClean="0"/>
+              <a:rPr lang="zh-TW" altLang="en-US"/>
               <a:t>按一下以編輯母片標題樣式</a:t>
             </a:r>
             <a:endParaRPr lang="en-US" dirty="0"/>
@@ -1839,35 +1838,35 @@
           <a:p>
             <a:pPr lvl="0"/>
             <a:r>
-              <a:rPr lang="zh-TW" altLang="en-US" smtClean="0"/>
+              <a:rPr lang="zh-TW" altLang="en-US"/>
               <a:t>編輯母片文字樣式</a:t>
             </a:r>
           </a:p>
           <a:p>
             <a:pPr lvl="1"/>
             <a:r>
-              <a:rPr lang="zh-TW" altLang="en-US" smtClean="0"/>
+              <a:rPr lang="zh-TW" altLang="en-US"/>
               <a:t>第二層</a:t>
             </a:r>
           </a:p>
           <a:p>
             <a:pPr lvl="2"/>
             <a:r>
-              <a:rPr lang="zh-TW" altLang="en-US" smtClean="0"/>
+              <a:rPr lang="zh-TW" altLang="en-US"/>
               <a:t>第三層</a:t>
             </a:r>
           </a:p>
           <a:p>
             <a:pPr lvl="3"/>
             <a:r>
-              <a:rPr lang="zh-TW" altLang="en-US" smtClean="0"/>
+              <a:rPr lang="zh-TW" altLang="en-US"/>
               <a:t>第四層</a:t>
             </a:r>
           </a:p>
           <a:p>
             <a:pPr lvl="4"/>
             <a:r>
-              <a:rPr lang="zh-TW" altLang="en-US" smtClean="0"/>
+              <a:rPr lang="zh-TW" altLang="en-US"/>
               <a:t>第五層</a:t>
             </a:r>
             <a:endParaRPr lang="en-US" dirty="0"/>
@@ -2090,7 +2089,7 @@
           </a:lstStyle>
           <a:p>
             <a:r>
-              <a:rPr lang="zh-TW" altLang="en-US" smtClean="0"/>
+              <a:rPr lang="zh-TW" altLang="en-US"/>
               <a:t>按一下以編輯母片標題樣式</a:t>
             </a:r>
             <a:endParaRPr lang="en-US" dirty="0"/>
@@ -2211,7 +2210,7 @@
           <a:p>
             <a:pPr lvl="0"/>
             <a:r>
-              <a:rPr lang="zh-TW" altLang="en-US" smtClean="0"/>
+              <a:rPr lang="zh-TW" altLang="en-US"/>
               <a:t>編輯母片文字樣式</a:t>
             </a:r>
           </a:p>
@@ -2371,7 +2370,7 @@
           <a:lstStyle/>
           <a:p>
             <a:r>
-              <a:rPr lang="zh-TW" altLang="en-US" smtClean="0"/>
+              <a:rPr lang="zh-TW" altLang="en-US"/>
               <a:t>按一下以編輯母片標題樣式</a:t>
             </a:r>
             <a:endParaRPr lang="en-US" dirty="0"/>
@@ -2400,35 +2399,35 @@
           <a:p>
             <a:pPr lvl="0"/>
             <a:r>
-              <a:rPr lang="zh-TW" altLang="en-US" smtClean="0"/>
+              <a:rPr lang="zh-TW" altLang="en-US"/>
               <a:t>編輯母片文字樣式</a:t>
             </a:r>
           </a:p>
           <a:p>
             <a:pPr lvl="1"/>
             <a:r>
-              <a:rPr lang="zh-TW" altLang="en-US" smtClean="0"/>
+              <a:rPr lang="zh-TW" altLang="en-US"/>
               <a:t>第二層</a:t>
             </a:r>
           </a:p>
           <a:p>
             <a:pPr lvl="2"/>
             <a:r>
-              <a:rPr lang="zh-TW" altLang="en-US" smtClean="0"/>
+              <a:rPr lang="zh-TW" altLang="en-US"/>
               <a:t>第三層</a:t>
             </a:r>
           </a:p>
           <a:p>
             <a:pPr lvl="3"/>
             <a:r>
-              <a:rPr lang="zh-TW" altLang="en-US" smtClean="0"/>
+              <a:rPr lang="zh-TW" altLang="en-US"/>
               <a:t>第四層</a:t>
             </a:r>
           </a:p>
           <a:p>
             <a:pPr lvl="4"/>
             <a:r>
-              <a:rPr lang="zh-TW" altLang="en-US" smtClean="0"/>
+              <a:rPr lang="zh-TW" altLang="en-US"/>
               <a:t>第五層</a:t>
             </a:r>
             <a:endParaRPr lang="en-US" dirty="0"/>
@@ -2457,35 +2456,35 @@
           <a:p>
             <a:pPr lvl="0"/>
             <a:r>
-              <a:rPr lang="zh-TW" altLang="en-US" smtClean="0"/>
+              <a:rPr lang="zh-TW" altLang="en-US"/>
               <a:t>編輯母片文字樣式</a:t>
             </a:r>
           </a:p>
           <a:p>
             <a:pPr lvl="1"/>
             <a:r>
-              <a:rPr lang="zh-TW" altLang="en-US" smtClean="0"/>
+              <a:rPr lang="zh-TW" altLang="en-US"/>
               <a:t>第二層</a:t>
             </a:r>
           </a:p>
           <a:p>
             <a:pPr lvl="2"/>
             <a:r>
-              <a:rPr lang="zh-TW" altLang="en-US" smtClean="0"/>
+              <a:rPr lang="zh-TW" altLang="en-US"/>
               <a:t>第三層</a:t>
             </a:r>
           </a:p>
           <a:p>
             <a:pPr lvl="3"/>
             <a:r>
-              <a:rPr lang="zh-TW" altLang="en-US" smtClean="0"/>
+              <a:rPr lang="zh-TW" altLang="en-US"/>
               <a:t>第四層</a:t>
             </a:r>
           </a:p>
           <a:p>
             <a:pPr lvl="4"/>
             <a:r>
-              <a:rPr lang="zh-TW" altLang="en-US" smtClean="0"/>
+              <a:rPr lang="zh-TW" altLang="en-US"/>
               <a:t>第五層</a:t>
             </a:r>
             <a:endParaRPr lang="en-US" dirty="0"/>
@@ -2608,7 +2607,7 @@
           <a:lstStyle/>
           <a:p>
             <a:r>
-              <a:rPr lang="zh-TW" altLang="en-US" smtClean="0"/>
+              <a:rPr lang="zh-TW" altLang="en-US"/>
               <a:t>按一下以編輯母片標題樣式</a:t>
             </a:r>
             <a:endParaRPr lang="en-US" dirty="0"/>
@@ -2680,7 +2679,7 @@
           <a:p>
             <a:pPr lvl="0"/>
             <a:r>
-              <a:rPr lang="zh-TW" altLang="en-US" smtClean="0"/>
+              <a:rPr lang="zh-TW" altLang="en-US"/>
               <a:t>編輯母片文字樣式</a:t>
             </a:r>
           </a:p>
@@ -2708,35 +2707,35 @@
           <a:p>
             <a:pPr lvl="0"/>
             <a:r>
-              <a:rPr lang="zh-TW" altLang="en-US" smtClean="0"/>
+              <a:rPr lang="zh-TW" altLang="en-US"/>
               <a:t>編輯母片文字樣式</a:t>
             </a:r>
           </a:p>
           <a:p>
             <a:pPr lvl="1"/>
             <a:r>
-              <a:rPr lang="zh-TW" altLang="en-US" smtClean="0"/>
+              <a:rPr lang="zh-TW" altLang="en-US"/>
               <a:t>第二層</a:t>
             </a:r>
           </a:p>
           <a:p>
             <a:pPr lvl="2"/>
             <a:r>
-              <a:rPr lang="zh-TW" altLang="en-US" smtClean="0"/>
+              <a:rPr lang="zh-TW" altLang="en-US"/>
               <a:t>第三層</a:t>
             </a:r>
           </a:p>
           <a:p>
             <a:pPr lvl="3"/>
             <a:r>
-              <a:rPr lang="zh-TW" altLang="en-US" smtClean="0"/>
+              <a:rPr lang="zh-TW" altLang="en-US"/>
               <a:t>第四層</a:t>
             </a:r>
           </a:p>
           <a:p>
             <a:pPr lvl="4"/>
             <a:r>
-              <a:rPr lang="zh-TW" altLang="en-US" smtClean="0"/>
+              <a:rPr lang="zh-TW" altLang="en-US"/>
               <a:t>第五層</a:t>
             </a:r>
             <a:endParaRPr lang="en-US" dirty="0"/>
@@ -2808,7 +2807,7 @@
           <a:p>
             <a:pPr lvl="0"/>
             <a:r>
-              <a:rPr lang="zh-TW" altLang="en-US" smtClean="0"/>
+              <a:rPr lang="zh-TW" altLang="en-US"/>
               <a:t>編輯母片文字樣式</a:t>
             </a:r>
           </a:p>
@@ -2836,35 +2835,35 @@
           <a:p>
             <a:pPr lvl="0"/>
             <a:r>
-              <a:rPr lang="zh-TW" altLang="en-US" smtClean="0"/>
+              <a:rPr lang="zh-TW" altLang="en-US"/>
               <a:t>編輯母片文字樣式</a:t>
             </a:r>
           </a:p>
           <a:p>
             <a:pPr lvl="1"/>
             <a:r>
-              <a:rPr lang="zh-TW" altLang="en-US" smtClean="0"/>
+              <a:rPr lang="zh-TW" altLang="en-US"/>
               <a:t>第二層</a:t>
             </a:r>
           </a:p>
           <a:p>
             <a:pPr lvl="2"/>
             <a:r>
-              <a:rPr lang="zh-TW" altLang="en-US" smtClean="0"/>
+              <a:rPr lang="zh-TW" altLang="en-US"/>
               <a:t>第三層</a:t>
             </a:r>
           </a:p>
           <a:p>
             <a:pPr lvl="3"/>
             <a:r>
-              <a:rPr lang="zh-TW" altLang="en-US" smtClean="0"/>
+              <a:rPr lang="zh-TW" altLang="en-US"/>
               <a:t>第四層</a:t>
             </a:r>
           </a:p>
           <a:p>
             <a:pPr lvl="4"/>
             <a:r>
-              <a:rPr lang="zh-TW" altLang="en-US" smtClean="0"/>
+              <a:rPr lang="zh-TW" altLang="en-US"/>
               <a:t>第五層</a:t>
             </a:r>
             <a:endParaRPr lang="en-US" dirty="0"/>
@@ -2982,7 +2981,7 @@
           <a:lstStyle/>
           <a:p>
             <a:r>
-              <a:rPr lang="zh-TW" altLang="en-US" smtClean="0"/>
+              <a:rPr lang="zh-TW" altLang="en-US"/>
               <a:t>按一下以編輯母片標題樣式</a:t>
             </a:r>
             <a:endParaRPr lang="en-US" dirty="0"/>
@@ -3370,7 +3369,7 @@
           </a:lstStyle>
           <a:p>
             <a:r>
-              <a:rPr lang="zh-TW" altLang="en-US" smtClean="0"/>
+              <a:rPr lang="zh-TW" altLang="en-US"/>
               <a:t>按一下以編輯母片標題樣式</a:t>
             </a:r>
             <a:endParaRPr lang="en-US" dirty="0"/>
@@ -3399,35 +3398,35 @@
           <a:p>
             <a:pPr lvl="0"/>
             <a:r>
-              <a:rPr lang="zh-TW" altLang="en-US" smtClean="0"/>
+              <a:rPr lang="zh-TW" altLang="en-US"/>
               <a:t>編輯母片文字樣式</a:t>
             </a:r>
           </a:p>
           <a:p>
             <a:pPr lvl="1"/>
             <a:r>
-              <a:rPr lang="zh-TW" altLang="en-US" smtClean="0"/>
+              <a:rPr lang="zh-TW" altLang="en-US"/>
               <a:t>第二層</a:t>
             </a:r>
           </a:p>
           <a:p>
             <a:pPr lvl="2"/>
             <a:r>
-              <a:rPr lang="zh-TW" altLang="en-US" smtClean="0"/>
+              <a:rPr lang="zh-TW" altLang="en-US"/>
               <a:t>第三層</a:t>
             </a:r>
           </a:p>
           <a:p>
             <a:pPr lvl="3"/>
             <a:r>
-              <a:rPr lang="zh-TW" altLang="en-US" smtClean="0"/>
+              <a:rPr lang="zh-TW" altLang="en-US"/>
               <a:t>第四層</a:t>
             </a:r>
           </a:p>
           <a:p>
             <a:pPr lvl="4"/>
             <a:r>
-              <a:rPr lang="zh-TW" altLang="en-US" smtClean="0"/>
+              <a:rPr lang="zh-TW" altLang="en-US"/>
               <a:t>第五層</a:t>
             </a:r>
             <a:endParaRPr lang="en-US" dirty="0"/>
@@ -3499,7 +3498,7 @@
           <a:p>
             <a:pPr lvl="0"/>
             <a:r>
-              <a:rPr lang="zh-TW" altLang="en-US" smtClean="0"/>
+              <a:rPr lang="zh-TW" altLang="en-US"/>
               <a:t>編輯母片文字樣式</a:t>
             </a:r>
           </a:p>
@@ -3737,7 +3736,7 @@
           </a:lstStyle>
           <a:p>
             <a:r>
-              <a:rPr lang="zh-TW" altLang="en-US" smtClean="0"/>
+              <a:rPr lang="zh-TW" altLang="en-US"/>
               <a:t>按一下以編輯母片標題樣式</a:t>
             </a:r>
             <a:endParaRPr lang="en-US" dirty="0"/>
@@ -3812,7 +3811,7 @@
           </a:lstStyle>
           <a:p>
             <a:r>
-              <a:rPr lang="zh-TW" altLang="en-US" smtClean="0"/>
+              <a:rPr lang="zh-TW" altLang="en-US"/>
               <a:t>按一下圖示以新增圖片</a:t>
             </a:r>
             <a:endParaRPr lang="en-US" dirty="0"/>
@@ -3890,7 +3889,7 @@
           <a:p>
             <a:pPr lvl="0"/>
             <a:r>
-              <a:rPr lang="zh-TW" altLang="en-US" smtClean="0"/>
+              <a:rPr lang="zh-TW" altLang="en-US"/>
               <a:t>編輯母片文字樣式</a:t>
             </a:r>
           </a:p>
@@ -4098,7 +4097,7 @@
           <a:lstStyle/>
           <a:p>
             <a:r>
-              <a:rPr lang="zh-TW" altLang="en-US" smtClean="0"/>
+              <a:rPr lang="zh-TW" altLang="en-US"/>
               <a:t>按一下以編輯母片標題樣式</a:t>
             </a:r>
             <a:endParaRPr lang="en-US" dirty="0"/>
@@ -4132,35 +4131,35 @@
           <a:p>
             <a:pPr lvl="0"/>
             <a:r>
-              <a:rPr lang="zh-TW" altLang="en-US" smtClean="0"/>
+              <a:rPr lang="zh-TW" altLang="en-US"/>
               <a:t>編輯母片文字樣式</a:t>
             </a:r>
           </a:p>
           <a:p>
             <a:pPr lvl="1"/>
             <a:r>
-              <a:rPr lang="zh-TW" altLang="en-US" smtClean="0"/>
+              <a:rPr lang="zh-TW" altLang="en-US"/>
               <a:t>第二層</a:t>
             </a:r>
           </a:p>
           <a:p>
             <a:pPr lvl="2"/>
             <a:r>
-              <a:rPr lang="zh-TW" altLang="en-US" smtClean="0"/>
+              <a:rPr lang="zh-TW" altLang="en-US"/>
               <a:t>第三層</a:t>
             </a:r>
           </a:p>
           <a:p>
             <a:pPr lvl="3"/>
             <a:r>
-              <a:rPr lang="zh-TW" altLang="en-US" smtClean="0"/>
+              <a:rPr lang="zh-TW" altLang="en-US"/>
               <a:t>第四層</a:t>
             </a:r>
           </a:p>
           <a:p>
             <a:pPr lvl="4"/>
             <a:r>
-              <a:rPr lang="zh-TW" altLang="en-US" smtClean="0"/>
+              <a:rPr lang="zh-TW" altLang="en-US"/>
               <a:t>第五層</a:t>
             </a:r>
             <a:endParaRPr lang="en-US" dirty="0"/>
@@ -4745,7 +4744,7 @@
           <a:lstStyle/>
           <a:p>
             <a:r>
-              <a:rPr lang="en-US" altLang="zh-TW" dirty="0" smtClean="0"/>
+              <a:rPr lang="en-US" altLang="zh-TW" dirty="0"/>
               <a:t>INFO5100 Final Project</a:t>
             </a:r>
             <a:endParaRPr lang="zh-TW" altLang="en-US" dirty="0"/>
@@ -4775,14 +4774,14 @@
           <a:lstStyle/>
           <a:p>
             <a:r>
-              <a:rPr lang="en-US" altLang="zh-TW" dirty="0" smtClean="0"/>
+              <a:rPr lang="en-US" altLang="zh-TW" dirty="0"/>
               <a:t>Team Name: </a:t>
             </a:r>
             <a:r>
-              <a:rPr lang="en-US" altLang="zh-TW" dirty="0" err="1" smtClean="0"/>
+              <a:rPr lang="en-US" altLang="zh-TW" dirty="0" err="1"/>
               <a:t>TeamName</a:t>
             </a:r>
-            <a:endParaRPr lang="en-US" altLang="zh-TW" dirty="0" smtClean="0"/>
+            <a:endParaRPr lang="en-US" altLang="zh-TW" dirty="0"/>
           </a:p>
         </p:txBody>
       </p:sp>
@@ -4809,63 +4808,55 @@
           <a:lstStyle/>
           <a:p>
             <a:r>
-              <a:rPr lang="en-US" altLang="zh-TW" dirty="0" err="1" smtClean="0"/>
+              <a:rPr lang="en-US" altLang="zh-TW" dirty="0" err="1"/>
               <a:t>Memebers</a:t>
             </a:r>
             <a:r>
-              <a:rPr lang="en-US" altLang="zh-TW" dirty="0" smtClean="0"/>
+              <a:rPr lang="en-US" altLang="zh-TW" dirty="0"/>
               <a:t>: Lin, </a:t>
             </a:r>
             <a:r>
-              <a:rPr lang="en-US" altLang="zh-TW" dirty="0" err="1" smtClean="0"/>
+              <a:rPr lang="en-US" altLang="zh-TW" dirty="0" err="1"/>
               <a:t>LiangYen</a:t>
             </a:r>
             <a:r>
-              <a:rPr lang="en-US" altLang="zh-TW" dirty="0" smtClean="0"/>
+              <a:rPr lang="en-US" altLang="zh-TW" dirty="0"/>
               <a:t>/  001304148</a:t>
             </a:r>
           </a:p>
           <a:p>
             <a:r>
               <a:rPr lang="en-US" altLang="zh-TW" dirty="0"/>
-              <a:t>	</a:t>
-            </a:r>
-            <a:r>
-              <a:rPr lang="en-US" altLang="zh-TW" dirty="0" smtClean="0"/>
-              <a:t>	    Tsai, </a:t>
-            </a:r>
-            <a:r>
-              <a:rPr lang="en-US" altLang="zh-TW" dirty="0" err="1" smtClean="0"/>
+              <a:t>		    Tsai, </a:t>
+            </a:r>
+            <a:r>
+              <a:rPr lang="en-US" altLang="zh-TW" dirty="0" err="1"/>
               <a:t>YuTing</a:t>
             </a:r>
             <a:r>
-              <a:rPr lang="en-US" altLang="zh-TW" dirty="0" smtClean="0"/>
+              <a:rPr lang="en-US" altLang="zh-TW" dirty="0"/>
               <a:t> /   001304955</a:t>
             </a:r>
           </a:p>
           <a:p>
             <a:r>
               <a:rPr lang="en-US" altLang="zh-TW" dirty="0"/>
-              <a:t>	</a:t>
-            </a:r>
-            <a:r>
-              <a:rPr lang="en-US" altLang="zh-TW" dirty="0" smtClean="0"/>
-              <a:t>	    </a:t>
-            </a:r>
-            <a:r>
-              <a:rPr lang="en-US" altLang="zh-TW" dirty="0" err="1" smtClean="0"/>
+              <a:t>		    </a:t>
+            </a:r>
+            <a:r>
+              <a:rPr lang="en-US" altLang="zh-TW" dirty="0" err="1"/>
               <a:t>Kuo</a:t>
             </a:r>
             <a:r>
-              <a:rPr lang="en-US" altLang="zh-TW" dirty="0" smtClean="0"/>
+              <a:rPr lang="en-US" altLang="zh-TW" dirty="0"/>
               <a:t>, </a:t>
             </a:r>
             <a:r>
-              <a:rPr lang="en-US" altLang="zh-TW" dirty="0" err="1" smtClean="0"/>
+              <a:rPr lang="en-US" altLang="zh-TW" dirty="0" err="1"/>
               <a:t>DahWei</a:t>
             </a:r>
             <a:r>
-              <a:rPr lang="en-US" altLang="zh-TW" dirty="0" smtClean="0"/>
+              <a:rPr lang="en-US" altLang="zh-TW" dirty="0"/>
               <a:t>/  001372878</a:t>
             </a:r>
             <a:endParaRPr lang="zh-TW" altLang="en-US" dirty="0"/>
@@ -4882,13 +4873,6 @@
   <p:clrMapOvr>
     <a:masterClrMapping/>
   </p:clrMapOvr>
-  <p:timing>
-    <p:tnLst>
-      <p:par>
-        <p:cTn id="1" dur="indefinite" restart="never" nodeType="tmRoot"/>
-      </p:par>
-    </p:tnLst>
-  </p:timing>
 </p:sld>
 </file>
 
@@ -4932,7 +4916,7 @@
           <a:lstStyle/>
           <a:p>
             <a:r>
-              <a:rPr lang="en-US" altLang="zh-TW" dirty="0" smtClean="0"/>
+              <a:rPr lang="en-US" altLang="zh-TW" dirty="0"/>
               <a:t>Work Request (Room Offer)</a:t>
             </a:r>
             <a:endParaRPr lang="zh-TW" altLang="en-US" dirty="0"/>
@@ -5347,7 +5331,7 @@
           <a:lstStyle/>
           <a:p>
             <a:r>
-              <a:rPr lang="en-US" altLang="zh-TW" dirty="0" smtClean="0"/>
+              <a:rPr lang="en-US" altLang="zh-TW" dirty="0"/>
               <a:t>Work flow of room:</a:t>
             </a:r>
             <a:endParaRPr lang="zh-TW" altLang="en-US" dirty="0"/>
@@ -5373,7 +5357,7 @@
               <a:buFont typeface="Wingdings" panose="05000000000000000000" pitchFamily="2" charset="2"/>
               <a:buChar char="l"/>
             </a:pPr>
-            <a:endParaRPr lang="en-US" altLang="zh-TW" dirty="0" smtClean="0"/>
+            <a:endParaRPr lang="en-US" altLang="zh-TW" dirty="0"/>
           </a:p>
           <a:p>
             <a:pPr>
@@ -5381,20 +5365,13 @@
               <a:buChar char="l"/>
             </a:pPr>
             <a:r>
-              <a:rPr lang="en-US" altLang="zh-TW" dirty="0" smtClean="0"/>
+              <a:rPr lang="en-US" altLang="zh-TW" dirty="0"/>
               <a:t> </a:t>
             </a:r>
             <a:r>
-              <a:rPr lang="en-US" altLang="zh-TW" sz="2400" dirty="0" smtClean="0"/>
+              <a:rPr lang="en-US" altLang="zh-TW" sz="2400" dirty="0"/>
               <a:t>Company/ Person offers room. (Status: Under review)</a:t>
             </a:r>
-          </a:p>
-          <a:p>
-            <a:pPr>
-              <a:buFont typeface="Wingdings" panose="05000000000000000000" pitchFamily="2" charset="2"/>
-              <a:buChar char="l"/>
-            </a:pPr>
-            <a:endParaRPr lang="en-US" altLang="zh-TW" sz="2400" dirty="0" smtClean="0"/>
           </a:p>
           <a:p>
             <a:pPr>
@@ -5408,17 +5385,17 @@
               <a:buFont typeface="Wingdings" panose="05000000000000000000" pitchFamily="2" charset="2"/>
               <a:buChar char="l"/>
             </a:pPr>
-            <a:r>
-              <a:rPr lang="en-US" altLang="zh-TW" sz="2400" dirty="0" smtClean="0"/>
-              <a:t> Room organization can approve the rooms offered.</a:t>
-            </a:r>
+            <a:endParaRPr lang="en-US" altLang="zh-TW" sz="2400" dirty="0"/>
           </a:p>
           <a:p>
             <a:pPr>
               <a:buFont typeface="Wingdings" panose="05000000000000000000" pitchFamily="2" charset="2"/>
               <a:buChar char="l"/>
             </a:pPr>
-            <a:endParaRPr lang="en-US" altLang="zh-TW" sz="2400" dirty="0" smtClean="0"/>
+            <a:r>
+              <a:rPr lang="en-US" altLang="zh-TW" sz="2400" dirty="0"/>
+              <a:t> Room organization can approve the rooms offered.</a:t>
+            </a:r>
           </a:p>
           <a:p>
             <a:pPr>
@@ -5432,17 +5409,24 @@
               <a:buFont typeface="Wingdings" panose="05000000000000000000" pitchFamily="2" charset="2"/>
               <a:buChar char="l"/>
             </a:pPr>
-            <a:r>
-              <a:rPr lang="en-US" altLang="zh-TW" sz="2400" dirty="0" smtClean="0"/>
-              <a:t> Company/ Person offered room status becomes approved.</a:t>
-            </a:r>
+            <a:endParaRPr lang="en-US" altLang="zh-TW" sz="2400" dirty="0"/>
           </a:p>
           <a:p>
             <a:pPr>
               <a:buFont typeface="Wingdings" panose="05000000000000000000" pitchFamily="2" charset="2"/>
               <a:buChar char="l"/>
             </a:pPr>
-            <a:endParaRPr lang="en-US" altLang="zh-TW" dirty="0" smtClean="0"/>
+            <a:r>
+              <a:rPr lang="en-US" altLang="zh-TW" sz="2400" dirty="0"/>
+              <a:t> Company/ Person offered room status becomes approved.</a:t>
+            </a:r>
+          </a:p>
+          <a:p>
+            <a:pPr>
+              <a:buFont typeface="Wingdings" panose="05000000000000000000" pitchFamily="2" charset="2"/>
+              <a:buChar char="l"/>
+            </a:pPr>
+            <a:endParaRPr lang="en-US" altLang="zh-TW" dirty="0"/>
           </a:p>
         </p:txBody>
       </p:sp>
@@ -5504,13 +5488,6 @@
   <p:clrMapOvr>
     <a:masterClrMapping/>
   </p:clrMapOvr>
-  <p:timing>
-    <p:tnLst>
-      <p:par>
-        <p:cTn id="1" dur="indefinite" restart="never" nodeType="tmRoot"/>
-      </p:par>
-    </p:tnLst>
-  </p:timing>
 </p:sld>
 </file>
 
@@ -5547,7 +5524,7 @@
           <a:lstStyle/>
           <a:p>
             <a:r>
-              <a:rPr lang="en-US" altLang="zh-TW" dirty="0" smtClean="0"/>
+              <a:rPr lang="en-US" altLang="zh-TW" dirty="0"/>
               <a:t>Work Requests (client book a room)</a:t>
             </a:r>
             <a:endParaRPr lang="zh-TW" altLang="en-US" dirty="0"/>
@@ -6222,7 +6199,7 @@
           <a:lstStyle/>
           <a:p>
             <a:r>
-              <a:rPr lang="en-US" altLang="zh-TW" dirty="0" smtClean="0"/>
+              <a:rPr lang="en-US" altLang="zh-TW" dirty="0"/>
               <a:t>Matching Organization:</a:t>
             </a:r>
             <a:endParaRPr lang="zh-TW" altLang="en-US" dirty="0"/>
@@ -6610,7 +6587,7 @@
           <a:lstStyle/>
           <a:p>
             <a:r>
-              <a:rPr lang="en-US" altLang="zh-TW" dirty="0" smtClean="0"/>
+              <a:rPr lang="en-US" altLang="zh-TW" dirty="0"/>
               <a:t>Work flow of applying a room:</a:t>
             </a:r>
             <a:endParaRPr lang="zh-TW" altLang="en-US" dirty="0"/>
@@ -6642,7 +6619,7 @@
               <a:buChar char="l"/>
             </a:pPr>
             <a:r>
-              <a:rPr lang="en-US" altLang="zh-TW" dirty="0" smtClean="0"/>
+              <a:rPr lang="en-US" altLang="zh-TW" dirty="0"/>
               <a:t> Client should set up an account first, then apply for a room. (Status : under review)</a:t>
             </a:r>
           </a:p>
@@ -6659,29 +6636,8 @@
               <a:buChar char="l"/>
             </a:pPr>
             <a:r>
-              <a:rPr lang="en-US" altLang="zh-TW" dirty="0" smtClean="0"/>
+              <a:rPr lang="en-US" altLang="zh-TW" dirty="0"/>
               <a:t> Patient organization can approve the application of a client.</a:t>
-            </a:r>
-          </a:p>
-          <a:p>
-            <a:pPr>
-              <a:buFont typeface="Wingdings" panose="05000000000000000000" pitchFamily="2" charset="2"/>
-              <a:buChar char="l"/>
-            </a:pPr>
-            <a:endParaRPr lang="en-US" altLang="zh-TW" dirty="0" smtClean="0"/>
-          </a:p>
-          <a:p>
-            <a:pPr>
-              <a:buFont typeface="Wingdings" panose="05000000000000000000" pitchFamily="2" charset="2"/>
-              <a:buChar char="l"/>
-            </a:pPr>
-            <a:r>
-              <a:rPr lang="en-US" altLang="zh-TW" dirty="0"/>
-              <a:t> </a:t>
-            </a:r>
-            <a:r>
-              <a:rPr lang="en-US" altLang="zh-TW" dirty="0" smtClean="0"/>
-              <a:t>Matching organization can match the room and the clients.</a:t>
             </a:r>
           </a:p>
           <a:p>
@@ -6697,17 +6653,33 @@
               <a:buChar char="l"/>
             </a:pPr>
             <a:r>
-              <a:rPr lang="en-US" altLang="zh-TW" dirty="0" smtClean="0"/>
-              <a:t>When successfully matched, the status becomes approved!</a:t>
-            </a:r>
-            <a:endParaRPr lang="en-US" altLang="zh-TW" dirty="0"/>
+              <a:rPr lang="en-US" altLang="zh-TW" dirty="0"/>
+              <a:t> Matching organization can match the room and the clients.</a:t>
+            </a:r>
           </a:p>
           <a:p>
             <a:pPr>
               <a:buFont typeface="Wingdings" panose="05000000000000000000" pitchFamily="2" charset="2"/>
               <a:buChar char="l"/>
             </a:pPr>
-            <a:endParaRPr lang="en-US" altLang="zh-TW" dirty="0" smtClean="0"/>
+            <a:endParaRPr lang="en-US" altLang="zh-TW" dirty="0"/>
+          </a:p>
+          <a:p>
+            <a:pPr>
+              <a:buFont typeface="Wingdings" panose="05000000000000000000" pitchFamily="2" charset="2"/>
+              <a:buChar char="l"/>
+            </a:pPr>
+            <a:r>
+              <a:rPr lang="en-US" altLang="zh-TW" dirty="0"/>
+              <a:t>When successfully matched, the status becomes approved!</a:t>
+            </a:r>
+          </a:p>
+          <a:p>
+            <a:pPr>
+              <a:buFont typeface="Wingdings" panose="05000000000000000000" pitchFamily="2" charset="2"/>
+              <a:buChar char="l"/>
+            </a:pPr>
+            <a:endParaRPr lang="en-US" altLang="zh-TW" dirty="0"/>
           </a:p>
           <a:p>
             <a:pPr>
@@ -6834,13 +6806,6 @@
   <p:clrMapOvr>
     <a:masterClrMapping/>
   </p:clrMapOvr>
-  <p:timing>
-    <p:tnLst>
-      <p:par>
-        <p:cTn id="1" dur="indefinite" restart="never" nodeType="tmRoot"/>
-      </p:par>
-    </p:tnLst>
-  </p:timing>
 </p:sld>
 </file>
 
@@ -6877,7 +6842,7 @@
           <a:lstStyle/>
           <a:p>
             <a:r>
-              <a:rPr lang="en-US" altLang="zh-TW" dirty="0" smtClean="0"/>
+              <a:rPr lang="en-US" altLang="zh-TW" dirty="0"/>
               <a:t>Global Level</a:t>
             </a:r>
             <a:endParaRPr lang="zh-TW" altLang="en-US" dirty="0"/>
@@ -6906,7 +6871,7 @@
               <a:buChar char="u"/>
             </a:pPr>
             <a:r>
-              <a:rPr lang="en-US" altLang="zh-TW" sz="2400" dirty="0" smtClean="0"/>
+              <a:rPr lang="en-US" altLang="zh-TW" sz="2400" dirty="0"/>
               <a:t> Global companies like Google, Facebook, Apple, they can be the funding enterprises. </a:t>
             </a:r>
           </a:p>
@@ -6923,7 +6888,7 @@
               <a:buChar char="u"/>
             </a:pPr>
             <a:r>
-              <a:rPr lang="en-US" altLang="zh-TW" sz="2400" dirty="0" smtClean="0"/>
+              <a:rPr lang="en-US" altLang="zh-TW" sz="2400" dirty="0"/>
               <a:t> With the help of local coordinate enterprises, this system can be spread around the world. </a:t>
             </a:r>
             <a:endParaRPr lang="zh-TW" altLang="en-US" sz="2400" dirty="0"/>
@@ -6940,13 +6905,6 @@
   <p:clrMapOvr>
     <a:masterClrMapping/>
   </p:clrMapOvr>
-  <p:timing>
-    <p:tnLst>
-      <p:par>
-        <p:cTn id="1" dur="indefinite" restart="never" nodeType="tmRoot"/>
-      </p:par>
-    </p:tnLst>
-  </p:timing>
 </p:sld>
 </file>
 
@@ -6991,7 +6949,7 @@
           <a:p>
             <a:pPr algn="ctr"/>
             <a:r>
-              <a:rPr lang="en-US" altLang="zh-TW" sz="2600" dirty="0" smtClean="0"/>
+              <a:rPr lang="en-US" altLang="zh-TW" sz="2600" dirty="0"/>
               <a:t>Thanks for your time! </a:t>
             </a:r>
             <a:endParaRPr lang="zh-TW" altLang="en-US" sz="2600" dirty="0"/>
@@ -7056,13 +7014,6 @@
   <p:clrMapOvr>
     <a:masterClrMapping/>
   </p:clrMapOvr>
-  <p:timing>
-    <p:tnLst>
-      <p:par>
-        <p:cTn id="1" dur="indefinite" restart="never" nodeType="tmRoot"/>
-      </p:par>
-    </p:tnLst>
-  </p:timing>
 </p:sld>
 </file>
 
@@ -7099,7 +7050,7 @@
           <a:lstStyle/>
           <a:p>
             <a:r>
-              <a:rPr lang="en-US" altLang="zh-TW" dirty="0" smtClean="0"/>
+              <a:rPr lang="en-US" altLang="zh-TW" dirty="0"/>
               <a:t>Outline</a:t>
             </a:r>
             <a:endParaRPr lang="zh-TW" altLang="en-US" dirty="0"/>
@@ -7131,14 +7082,14 @@
               <a:buChar char="ü"/>
             </a:pPr>
             <a:r>
-              <a:rPr lang="en-US" altLang="zh-TW" dirty="0" smtClean="0"/>
+              <a:rPr lang="en-US" altLang="zh-TW" dirty="0"/>
               <a:t> </a:t>
             </a:r>
             <a:r>
-              <a:rPr lang="en-US" altLang="zh-TW" dirty="0" err="1" smtClean="0"/>
+              <a:rPr lang="en-US" altLang="zh-TW" dirty="0" err="1"/>
               <a:t>Prolem</a:t>
             </a:r>
-            <a:endParaRPr lang="en-US" altLang="zh-TW" dirty="0" smtClean="0"/>
+            <a:endParaRPr lang="en-US" altLang="zh-TW" dirty="0"/>
           </a:p>
           <a:p>
             <a:pPr>
@@ -7146,7 +7097,7 @@
               <a:buChar char="ü"/>
             </a:pPr>
             <a:r>
-              <a:rPr lang="en-US" altLang="zh-TW" dirty="0" smtClean="0"/>
+              <a:rPr lang="en-US" altLang="zh-TW" dirty="0"/>
               <a:t> Solution</a:t>
             </a:r>
           </a:p>
@@ -7156,7 +7107,7 @@
               <a:buChar char="ü"/>
             </a:pPr>
             <a:r>
-              <a:rPr lang="en-US" altLang="zh-TW" dirty="0" smtClean="0"/>
+              <a:rPr lang="en-US" altLang="zh-TW" dirty="0"/>
               <a:t> Intro to Our Application : </a:t>
             </a:r>
           </a:p>
@@ -7176,7 +7127,7 @@
               <a:buChar char="•"/>
             </a:pPr>
             <a:r>
-              <a:rPr lang="en-US" altLang="zh-TW" sz="2000" dirty="0" smtClean="0"/>
+              <a:rPr lang="en-US" altLang="zh-TW" sz="2000" dirty="0"/>
               <a:t>Architecture</a:t>
             </a:r>
           </a:p>
@@ -7186,7 +7137,7 @@
               <a:buChar char="•"/>
             </a:pPr>
             <a:r>
-              <a:rPr lang="en-US" altLang="zh-TW" sz="2000" dirty="0" smtClean="0"/>
+              <a:rPr lang="en-US" altLang="zh-TW" sz="2000" dirty="0"/>
               <a:t>Enterprises and Organizations</a:t>
             </a:r>
           </a:p>
@@ -7196,7 +7147,7 @@
               <a:buChar char="•"/>
             </a:pPr>
             <a:r>
-              <a:rPr lang="en-US" altLang="zh-TW" sz="2000" dirty="0" smtClean="0"/>
+              <a:rPr lang="en-US" altLang="zh-TW" sz="2000" dirty="0"/>
               <a:t>Screenshots &amp; work flows/ work requests</a:t>
             </a:r>
           </a:p>
@@ -7206,7 +7157,7 @@
               <a:buChar char="ü"/>
             </a:pPr>
             <a:r>
-              <a:rPr lang="en-US" altLang="zh-TW" dirty="0" smtClean="0"/>
+              <a:rPr lang="en-US" altLang="zh-TW" dirty="0"/>
               <a:t> Global level</a:t>
             </a:r>
           </a:p>
@@ -7216,12 +7167,12 @@
               <a:buChar char="ü"/>
             </a:pPr>
             <a:r>
-              <a:rPr lang="en-US" altLang="zh-TW" dirty="0" smtClean="0"/>
+              <a:rPr lang="en-US" altLang="zh-TW" dirty="0"/>
               <a:t> Demo</a:t>
             </a:r>
           </a:p>
           <a:p>
-            <a:endParaRPr lang="en-US" altLang="zh-TW" dirty="0" smtClean="0"/>
+            <a:endParaRPr lang="en-US" altLang="zh-TW" dirty="0"/>
           </a:p>
         </p:txBody>
       </p:sp>
@@ -7235,13 +7186,6 @@
   <p:clrMapOvr>
     <a:masterClrMapping/>
   </p:clrMapOvr>
-  <p:timing>
-    <p:tnLst>
-      <p:par>
-        <p:cTn id="1" dur="indefinite" restart="never" nodeType="tmRoot"/>
-      </p:par>
-    </p:tnLst>
-  </p:timing>
 </p:sld>
 </file>
 
@@ -7278,7 +7222,7 @@
           <a:lstStyle/>
           <a:p>
             <a:r>
-              <a:rPr lang="en-US" altLang="zh-TW" dirty="0" smtClean="0"/>
+              <a:rPr lang="en-US" altLang="zh-TW" dirty="0"/>
               <a:t>Problem</a:t>
             </a:r>
             <a:endParaRPr lang="zh-TW" altLang="en-US" dirty="0"/>
@@ -7312,7 +7256,7 @@
               <a:buChar char="u"/>
             </a:pPr>
             <a:r>
-              <a:rPr lang="en-US" altLang="zh-TW" sz="2400" dirty="0" smtClean="0"/>
+              <a:rPr lang="en-US" altLang="zh-TW" sz="2400" dirty="0"/>
               <a:t>Due to resource inequality, people live in remote area  cannot receive proper         medical treatment.</a:t>
             </a:r>
           </a:p>
@@ -7329,7 +7273,7 @@
               <a:buChar char="u"/>
             </a:pPr>
             <a:r>
-              <a:rPr lang="en-US" altLang="zh-TW" sz="2400" dirty="0" smtClean="0"/>
+              <a:rPr lang="en-US" altLang="zh-TW" sz="2400" dirty="0"/>
               <a:t>People who are poor can’t afford medical treatment fee, even if they can, most of them cannot afford the hotel fee when they search for a better medical treatment in a big city.</a:t>
             </a:r>
             <a:endParaRPr lang="zh-TW" altLang="en-US" sz="2400" dirty="0"/>
@@ -7346,13 +7290,6 @@
   <p:clrMapOvr>
     <a:masterClrMapping/>
   </p:clrMapOvr>
-  <p:timing>
-    <p:tnLst>
-      <p:par>
-        <p:cTn id="1" dur="indefinite" restart="never" nodeType="tmRoot"/>
-      </p:par>
-    </p:tnLst>
-  </p:timing>
 </p:sld>
 </file>
 
@@ -7389,7 +7326,7 @@
           <a:lstStyle/>
           <a:p>
             <a:r>
-              <a:rPr lang="en-US" altLang="zh-TW" dirty="0" smtClean="0"/>
+              <a:rPr lang="en-US" altLang="zh-TW" dirty="0"/>
               <a:t>Solution</a:t>
             </a:r>
             <a:endParaRPr lang="zh-TW" altLang="en-US" dirty="0"/>
@@ -7418,7 +7355,7 @@
               <a:buChar char="u"/>
             </a:pPr>
             <a:r>
-              <a:rPr lang="en-US" altLang="zh-TW" sz="2400" dirty="0" smtClean="0"/>
+              <a:rPr lang="en-US" altLang="zh-TW" sz="2400" dirty="0"/>
               <a:t> Ronald McDonald’s House Charities (RMHC) has solved some of the housing problems when people search for medical treatment. However, they did not allow personal housing offered.</a:t>
             </a:r>
           </a:p>
@@ -7436,11 +7373,7 @@
             </a:pPr>
             <a:r>
               <a:rPr lang="en-US" altLang="zh-TW" sz="2400" dirty="0"/>
-              <a:t> </a:t>
-            </a:r>
-            <a:r>
-              <a:rPr lang="en-US" altLang="zh-TW" sz="2400" dirty="0" smtClean="0"/>
-              <a:t>We believe that kind people can also provide free rooms for those who cannot afford the hotel. So we combine the idea of Airbnb and RMHC.</a:t>
+              <a:t> We believe that kind people can also provide free rooms for those who cannot afford the hotel. So we combine the idea of Airbnb and RMHC.</a:t>
             </a:r>
           </a:p>
           <a:p>
@@ -7448,7 +7381,7 @@
               <a:buFont typeface="Wingdings" panose="05000000000000000000" pitchFamily="2" charset="2"/>
               <a:buChar char="u"/>
             </a:pPr>
-            <a:endParaRPr lang="en-US" altLang="zh-TW" sz="2400" dirty="0" smtClean="0"/>
+            <a:endParaRPr lang="en-US" altLang="zh-TW" sz="2400" dirty="0"/>
           </a:p>
           <a:p>
             <a:pPr>
@@ -7456,7 +7389,7 @@
               <a:buChar char="u"/>
             </a:pPr>
             <a:r>
-              <a:rPr lang="en-US" altLang="zh-TW" sz="2400" dirty="0" smtClean="0"/>
+              <a:rPr lang="en-US" altLang="zh-TW" sz="2400" dirty="0"/>
               <a:t> With proper management, we can help a patient/ patient’s family, by providing them a suitable room.</a:t>
             </a:r>
             <a:endParaRPr lang="zh-TW" altLang="en-US" sz="2400" dirty="0"/>
@@ -7473,13 +7406,6 @@
   <p:clrMapOvr>
     <a:masterClrMapping/>
   </p:clrMapOvr>
-  <p:timing>
-    <p:tnLst>
-      <p:par>
-        <p:cTn id="1" dur="indefinite" restart="never" nodeType="tmRoot"/>
-      </p:par>
-    </p:tnLst>
-  </p:timing>
 </p:sld>
 </file>
 
@@ -7516,7 +7442,7 @@
           <a:lstStyle/>
           <a:p>
             <a:r>
-              <a:rPr lang="en-US" altLang="zh-TW" dirty="0" smtClean="0"/>
+              <a:rPr lang="en-US" altLang="zh-TW" dirty="0"/>
               <a:t>Intro to Our Application</a:t>
             </a:r>
             <a:endParaRPr lang="zh-TW" altLang="en-US" dirty="0"/>
@@ -7541,7 +7467,7 @@
           <a:lstStyle/>
           <a:p>
             <a:r>
-              <a:rPr lang="en-US" altLang="zh-TW" sz="2400" dirty="0" smtClean="0"/>
+              <a:rPr lang="en-US" altLang="zh-TW" sz="2400" dirty="0"/>
               <a:t>Basic concept of the system:</a:t>
             </a:r>
           </a:p>
@@ -7554,16 +7480,8 @@
               <a:buChar char="u"/>
             </a:pPr>
             <a:r>
-              <a:rPr lang="en-US" altLang="zh-TW" sz="2400" dirty="0" smtClean="0"/>
-              <a:t> </a:t>
-            </a:r>
-            <a:r>
               <a:rPr lang="en-US" altLang="zh-TW" sz="2400" dirty="0"/>
-              <a:t>A</a:t>
-            </a:r>
-            <a:r>
-              <a:rPr lang="en-US" altLang="zh-TW" sz="2400" dirty="0" smtClean="0"/>
-              <a:t>llows people or company to offer their rooms for people who need it.</a:t>
+              <a:t> Allows people or company to offer their rooms for people who need it.</a:t>
             </a:r>
           </a:p>
           <a:p>
@@ -7573,11 +7491,7 @@
             </a:pPr>
             <a:r>
               <a:rPr lang="en-US" altLang="zh-TW" sz="2400" dirty="0"/>
-              <a:t> </a:t>
-            </a:r>
-            <a:r>
-              <a:rPr lang="en-US" altLang="zh-TW" sz="2400" dirty="0" smtClean="0"/>
-              <a:t>Allows people who need it to apply for a room.</a:t>
+              <a:t> Allows people who need it to apply for a room.</a:t>
             </a:r>
           </a:p>
           <a:p>
@@ -7586,7 +7500,7 @@
               <a:buChar char="u"/>
             </a:pPr>
             <a:r>
-              <a:rPr lang="en-US" altLang="zh-TW" sz="2400" dirty="0" smtClean="0"/>
+              <a:rPr lang="en-US" altLang="zh-TW" sz="2400" dirty="0"/>
               <a:t> Coordinate enterprise can approved the rooms offered by companies/person,</a:t>
             </a:r>
           </a:p>
@@ -7596,11 +7510,7 @@
             </a:pPr>
             <a:r>
               <a:rPr lang="en-US" altLang="zh-TW" sz="2400" dirty="0"/>
-              <a:t> </a:t>
-            </a:r>
-            <a:r>
-              <a:rPr lang="en-US" altLang="zh-TW" sz="2400" dirty="0" smtClean="0"/>
-              <a:t>    and the applications from clients/patients.</a:t>
+              <a:t>     and the applications from clients/patients.</a:t>
             </a:r>
           </a:p>
           <a:p>
@@ -7609,7 +7519,7 @@
               <a:buChar char="u"/>
             </a:pPr>
             <a:r>
-              <a:rPr lang="en-US" altLang="zh-TW" sz="2400" dirty="0" smtClean="0"/>
+              <a:rPr lang="en-US" altLang="zh-TW" sz="2400" dirty="0"/>
               <a:t> Coordinate enterprise can match the rooms for the clients.</a:t>
             </a:r>
           </a:p>
@@ -7618,7 +7528,7 @@
               <a:buFont typeface="Wingdings" panose="05000000000000000000" pitchFamily="2" charset="2"/>
               <a:buChar char="u"/>
             </a:pPr>
-            <a:endParaRPr lang="en-US" altLang="zh-TW" sz="2400" dirty="0" smtClean="0"/>
+            <a:endParaRPr lang="en-US" altLang="zh-TW" sz="2400" dirty="0"/>
           </a:p>
           <a:p>
             <a:pPr>
@@ -7639,13 +7549,6 @@
   <p:clrMapOvr>
     <a:masterClrMapping/>
   </p:clrMapOvr>
-  <p:timing>
-    <p:tnLst>
-      <p:par>
-        <p:cTn id="1" dur="indefinite" restart="never" nodeType="tmRoot"/>
-      </p:par>
-    </p:tnLst>
-  </p:timing>
 </p:sld>
 </file>
 
@@ -7682,7 +7585,7 @@
           <a:lstStyle/>
           <a:p>
             <a:r>
-              <a:rPr lang="en-US" altLang="zh-TW" dirty="0" smtClean="0"/>
+              <a:rPr lang="en-US" altLang="zh-TW" dirty="0"/>
               <a:t>Intro to Our Application</a:t>
             </a:r>
             <a:endParaRPr lang="zh-TW" altLang="en-US" dirty="0"/>
@@ -7707,7 +7610,7 @@
           <a:lstStyle/>
           <a:p>
             <a:r>
-              <a:rPr lang="en-US" altLang="zh-TW" sz="2400" dirty="0" smtClean="0"/>
+              <a:rPr lang="en-US" altLang="zh-TW" sz="2400" dirty="0"/>
               <a:t>Architecture:</a:t>
             </a:r>
             <a:endParaRPr lang="zh-TW" altLang="en-US" sz="2400" dirty="0"/>
@@ -7716,7 +7619,13 @@
       </p:sp>
       <p:pic>
         <p:nvPicPr>
-          <p:cNvPr id="5" name="圖片 4"/>
+          <p:cNvPr id="6" name="圖片 5">
+            <a:extLst>
+              <a:ext uri="{FF2B5EF4-FFF2-40B4-BE49-F238E27FC236}">
+                <a16:creationId xmlns:a16="http://schemas.microsoft.com/office/drawing/2014/main" id="{0CA3FC67-4C86-455F-880D-37F984F185B7}"/>
+              </a:ext>
+            </a:extLst>
+          </p:cNvPr>
           <p:cNvPicPr>
             <a:picLocks noChangeAspect="1"/>
           </p:cNvPicPr>
@@ -7736,8 +7645,8 @@
         </p:blipFill>
         <p:spPr>
           <a:xfrm>
-            <a:off x="374072" y="286603"/>
-            <a:ext cx="12192000" cy="6081679"/>
+            <a:off x="785660" y="74606"/>
+            <a:ext cx="11511443" cy="6216472"/>
           </a:xfrm>
           <a:prstGeom prst="rect">
             <a:avLst/>
@@ -7754,89 +7663,6 @@
   <p:clrMapOvr>
     <a:masterClrMapping/>
   </p:clrMapOvr>
-  <p:timing>
-    <p:tnLst>
-      <p:par>
-        <p:cTn id="1" dur="indefinite" restart="never" nodeType="tmRoot">
-          <p:childTnLst>
-            <p:seq concurrent="1" nextAc="seek">
-              <p:cTn id="2" dur="indefinite" nodeType="mainSeq">
-                <p:childTnLst>
-                  <p:par>
-                    <p:cTn id="3" fill="hold">
-                      <p:stCondLst>
-                        <p:cond delay="indefinite"/>
-                      </p:stCondLst>
-                      <p:childTnLst>
-                        <p:par>
-                          <p:cTn id="4" fill="hold">
-                            <p:stCondLst>
-                              <p:cond delay="0"/>
-                            </p:stCondLst>
-                            <p:childTnLst>
-                              <p:par>
-                                <p:cTn id="5" presetID="10" presetClass="entr" presetSubtype="0" fill="hold" nodeType="clickEffect">
-                                  <p:stCondLst>
-                                    <p:cond delay="0"/>
-                                  </p:stCondLst>
-                                  <p:childTnLst>
-                                    <p:set>
-                                      <p:cBhvr>
-                                        <p:cTn id="6" dur="1" fill="hold">
-                                          <p:stCondLst>
-                                            <p:cond delay="0"/>
-                                          </p:stCondLst>
-                                        </p:cTn>
-                                        <p:tgtEl>
-                                          <p:spTgt spid="5"/>
-                                        </p:tgtEl>
-                                        <p:attrNameLst>
-                                          <p:attrName>style.visibility</p:attrName>
-                                        </p:attrNameLst>
-                                      </p:cBhvr>
-                                      <p:to>
-                                        <p:strVal val="visible"/>
-                                      </p:to>
-                                    </p:set>
-                                    <p:animEffect transition="in" filter="fade">
-                                      <p:cBhvr>
-                                        <p:cTn id="7" dur="500"/>
-                                        <p:tgtEl>
-                                          <p:spTgt spid="5"/>
-                                        </p:tgtEl>
-                                      </p:cBhvr>
-                                    </p:animEffect>
-                                  </p:childTnLst>
-                                </p:cTn>
-                              </p:par>
-                            </p:childTnLst>
-                          </p:cTn>
-                        </p:par>
-                      </p:childTnLst>
-                    </p:cTn>
-                  </p:par>
-                </p:childTnLst>
-              </p:cTn>
-              <p:prevCondLst>
-                <p:cond evt="onPrev" delay="0">
-                  <p:tgtEl>
-                    <p:sldTgt/>
-                  </p:tgtEl>
-                </p:cond>
-              </p:prevCondLst>
-              <p:nextCondLst>
-                <p:cond evt="onNext" delay="0">
-                  <p:tgtEl>
-                    <p:sldTgt/>
-                  </p:tgtEl>
-                </p:cond>
-              </p:nextCondLst>
-            </p:seq>
-          </p:childTnLst>
-        </p:cTn>
-      </p:par>
-    </p:tnLst>
-  </p:timing>
 </p:sld>
 </file>
 
@@ -7873,7 +7699,7 @@
           <a:lstStyle/>
           <a:p>
             <a:r>
-              <a:rPr lang="en-US" altLang="zh-TW" dirty="0" smtClean="0"/>
+              <a:rPr lang="en-US" altLang="zh-TW" dirty="0"/>
               <a:t>Intro to Our Application</a:t>
             </a:r>
             <a:endParaRPr lang="zh-TW" altLang="en-US" dirty="0"/>
@@ -7906,11 +7732,11 @@
               <a:buNone/>
             </a:pPr>
             <a:r>
-              <a:rPr lang="en-US" altLang="zh-TW" sz="2600" b="1" dirty="0" smtClean="0"/>
+              <a:rPr lang="en-US" altLang="zh-TW" sz="2600" b="1" dirty="0"/>
               <a:t>  </a:t>
             </a:r>
             <a:r>
-              <a:rPr lang="en-US" altLang="zh-TW" sz="2800" b="1" dirty="0" smtClean="0"/>
+              <a:rPr lang="en-US" altLang="zh-TW" sz="2800" b="1" dirty="0"/>
               <a:t>Enterprises:</a:t>
             </a:r>
           </a:p>
@@ -7920,11 +7746,11 @@
               <a:buChar char="u"/>
             </a:pPr>
             <a:r>
-              <a:rPr lang="en-US" altLang="zh-TW" sz="2400" b="1" dirty="0" smtClean="0"/>
+              <a:rPr lang="en-US" altLang="zh-TW" sz="2400" b="1" dirty="0"/>
               <a:t>  </a:t>
             </a:r>
             <a:r>
-              <a:rPr lang="en-US" altLang="zh-TW" sz="2400" dirty="0" smtClean="0"/>
+              <a:rPr lang="en-US" altLang="zh-TW" sz="2400" dirty="0"/>
               <a:t>Funding enterprises</a:t>
             </a:r>
           </a:p>
@@ -7934,21 +7760,21 @@
               <a:buChar char="u"/>
             </a:pPr>
             <a:r>
-              <a:rPr lang="en-US" altLang="zh-TW" sz="2400" dirty="0" smtClean="0"/>
+              <a:rPr lang="en-US" altLang="zh-TW" sz="2400" dirty="0"/>
               <a:t>  Coordinate enterprises</a:t>
             </a:r>
-            <a:endParaRPr lang="en-US" altLang="zh-TW" dirty="0" smtClean="0"/>
+            <a:endParaRPr lang="en-US" altLang="zh-TW" dirty="0"/>
           </a:p>
           <a:p>
             <a:pPr lvl="1">
               <a:buFont typeface="Wingdings" panose="05000000000000000000" pitchFamily="2" charset="2"/>
               <a:buChar char="u"/>
             </a:pPr>
-            <a:endParaRPr lang="en-US" altLang="zh-TW" sz="2200" dirty="0" smtClean="0"/>
-          </a:p>
-          <a:p>
-            <a:r>
-              <a:rPr lang="en-US" altLang="zh-TW" sz="2800" b="1" dirty="0" smtClean="0"/>
+            <a:endParaRPr lang="en-US" altLang="zh-TW" sz="2200" dirty="0"/>
+          </a:p>
+          <a:p>
+            <a:r>
+              <a:rPr lang="en-US" altLang="zh-TW" sz="2800" b="1" dirty="0"/>
               <a:t>Organizations: </a:t>
             </a:r>
           </a:p>
@@ -7958,10 +7784,9 @@
               <a:buChar char="u"/>
             </a:pPr>
             <a:r>
-              <a:rPr lang="en-US" altLang="zh-TW" sz="2400" dirty="0" smtClean="0"/>
+              <a:rPr lang="en-US" altLang="zh-TW" sz="2400" dirty="0"/>
               <a:t>  Patients/ Rooms qualified organization</a:t>
             </a:r>
-            <a:endParaRPr lang="en-US" altLang="zh-TW" sz="2400" dirty="0"/>
           </a:p>
           <a:p>
             <a:pPr lvl="1">
@@ -7969,7 +7794,7 @@
               <a:buChar char="u"/>
             </a:pPr>
             <a:r>
-              <a:rPr lang="en-US" altLang="zh-TW" sz="2400" dirty="0" smtClean="0"/>
+              <a:rPr lang="en-US" altLang="zh-TW" sz="2400" dirty="0"/>
               <a:t>  Clients organization</a:t>
             </a:r>
           </a:p>
@@ -7979,7 +7804,7 @@
               <a:buChar char="u"/>
             </a:pPr>
             <a:r>
-              <a:rPr lang="en-US" altLang="zh-TW" sz="2400" dirty="0" smtClean="0"/>
+              <a:rPr lang="en-US" altLang="zh-TW" sz="2400" dirty="0"/>
               <a:t>  Matching organization</a:t>
             </a:r>
           </a:p>
@@ -7989,7 +7814,7 @@
               <a:buChar char="u"/>
             </a:pPr>
             <a:r>
-              <a:rPr lang="en-US" altLang="zh-TW" sz="2400" dirty="0" smtClean="0"/>
+              <a:rPr lang="en-US" altLang="zh-TW" sz="2400" dirty="0"/>
               <a:t>  Personal housing offers organization</a:t>
             </a:r>
           </a:p>
@@ -7999,7 +7824,7 @@
               <a:buChar char="u"/>
             </a:pPr>
             <a:r>
-              <a:rPr lang="en-US" altLang="zh-TW" sz="2400" dirty="0" smtClean="0"/>
+              <a:rPr lang="en-US" altLang="zh-TW" sz="2400" dirty="0"/>
               <a:t>  Company housing offers organization</a:t>
             </a:r>
           </a:p>
@@ -8009,7 +7834,7 @@
               <a:buChar char="u"/>
             </a:pPr>
             <a:r>
-              <a:rPr lang="en-US" altLang="zh-TW" sz="2400" dirty="0" smtClean="0"/>
+              <a:rPr lang="en-US" altLang="zh-TW" sz="2400" dirty="0"/>
               <a:t>  Admin organization</a:t>
             </a:r>
           </a:p>
@@ -8025,13 +7850,6 @@
   <p:clrMapOvr>
     <a:masterClrMapping/>
   </p:clrMapOvr>
-  <p:timing>
-    <p:tnLst>
-      <p:par>
-        <p:cTn id="1" dur="indefinite" restart="never" nodeType="tmRoot"/>
-      </p:par>
-    </p:tnLst>
-  </p:timing>
 </p:sld>
 </file>
 
@@ -8068,7 +7886,7 @@
           <a:lstStyle/>
           <a:p>
             <a:r>
-              <a:rPr lang="en-US" altLang="zh-TW" dirty="0" smtClean="0"/>
+              <a:rPr lang="en-US" altLang="zh-TW" dirty="0"/>
               <a:t>Intro to Our Application</a:t>
             </a:r>
             <a:endParaRPr lang="zh-TW" altLang="en-US" dirty="0"/>
@@ -8093,7 +7911,7 @@
           <a:lstStyle/>
           <a:p>
             <a:r>
-              <a:rPr lang="en-US" altLang="zh-TW" sz="2400" dirty="0" smtClean="0"/>
+              <a:rPr lang="en-US" altLang="zh-TW" sz="2400" dirty="0"/>
               <a:t>Key screenshots &amp; work flows/ work requests:</a:t>
             </a:r>
             <a:endParaRPr lang="zh-TW" altLang="en-US" sz="2400" dirty="0"/>

</xml_diff>